<commit_message>
add peers and docker successfully
</commit_message>
<xml_diff>
--- a/example_network.pptx
+++ b/example_network.pptx
@@ -260,7 +260,7 @@
           <a:p>
             <a:fld id="{64E90CE6-407E-314E-8831-A758B2A8D2EF}" type="datetimeFigureOut">
               <a:rPr lang="en-US" smtClean="0"/>
-              <a:t>1/21/23</a:t>
+              <a:t>1/22/23</a:t>
             </a:fld>
             <a:endParaRPr lang="en-US"/>
           </a:p>
@@ -458,7 +458,7 @@
           <a:p>
             <a:fld id="{64E90CE6-407E-314E-8831-A758B2A8D2EF}" type="datetimeFigureOut">
               <a:rPr lang="en-US" smtClean="0"/>
-              <a:t>1/21/23</a:t>
+              <a:t>1/22/23</a:t>
             </a:fld>
             <a:endParaRPr lang="en-US"/>
           </a:p>
@@ -666,7 +666,7 @@
           <a:p>
             <a:fld id="{64E90CE6-407E-314E-8831-A758B2A8D2EF}" type="datetimeFigureOut">
               <a:rPr lang="en-US" smtClean="0"/>
-              <a:t>1/21/23</a:t>
+              <a:t>1/22/23</a:t>
             </a:fld>
             <a:endParaRPr lang="en-US"/>
           </a:p>
@@ -864,7 +864,7 @@
           <a:p>
             <a:fld id="{64E90CE6-407E-314E-8831-A758B2A8D2EF}" type="datetimeFigureOut">
               <a:rPr lang="en-US" smtClean="0"/>
-              <a:t>1/21/23</a:t>
+              <a:t>1/22/23</a:t>
             </a:fld>
             <a:endParaRPr lang="en-US"/>
           </a:p>
@@ -1139,7 +1139,7 @@
           <a:p>
             <a:fld id="{64E90CE6-407E-314E-8831-A758B2A8D2EF}" type="datetimeFigureOut">
               <a:rPr lang="en-US" smtClean="0"/>
-              <a:t>1/21/23</a:t>
+              <a:t>1/22/23</a:t>
             </a:fld>
             <a:endParaRPr lang="en-US"/>
           </a:p>
@@ -1404,7 +1404,7 @@
           <a:p>
             <a:fld id="{64E90CE6-407E-314E-8831-A758B2A8D2EF}" type="datetimeFigureOut">
               <a:rPr lang="en-US" smtClean="0"/>
-              <a:t>1/21/23</a:t>
+              <a:t>1/22/23</a:t>
             </a:fld>
             <a:endParaRPr lang="en-US"/>
           </a:p>
@@ -1816,7 +1816,7 @@
           <a:p>
             <a:fld id="{64E90CE6-407E-314E-8831-A758B2A8D2EF}" type="datetimeFigureOut">
               <a:rPr lang="en-US" smtClean="0"/>
-              <a:t>1/21/23</a:t>
+              <a:t>1/22/23</a:t>
             </a:fld>
             <a:endParaRPr lang="en-US"/>
           </a:p>
@@ -1957,7 +1957,7 @@
           <a:p>
             <a:fld id="{64E90CE6-407E-314E-8831-A758B2A8D2EF}" type="datetimeFigureOut">
               <a:rPr lang="en-US" smtClean="0"/>
-              <a:t>1/21/23</a:t>
+              <a:t>1/22/23</a:t>
             </a:fld>
             <a:endParaRPr lang="en-US"/>
           </a:p>
@@ -2070,7 +2070,7 @@
           <a:p>
             <a:fld id="{64E90CE6-407E-314E-8831-A758B2A8D2EF}" type="datetimeFigureOut">
               <a:rPr lang="en-US" smtClean="0"/>
-              <a:t>1/21/23</a:t>
+              <a:t>1/22/23</a:t>
             </a:fld>
             <a:endParaRPr lang="en-US"/>
           </a:p>
@@ -2381,7 +2381,7 @@
           <a:p>
             <a:fld id="{64E90CE6-407E-314E-8831-A758B2A8D2EF}" type="datetimeFigureOut">
               <a:rPr lang="en-US" smtClean="0"/>
-              <a:t>1/21/23</a:t>
+              <a:t>1/22/23</a:t>
             </a:fld>
             <a:endParaRPr lang="en-US"/>
           </a:p>
@@ -2669,7 +2669,7 @@
           <a:p>
             <a:fld id="{64E90CE6-407E-314E-8831-A758B2A8D2EF}" type="datetimeFigureOut">
               <a:rPr lang="en-US" smtClean="0"/>
-              <a:t>1/21/23</a:t>
+              <a:t>1/22/23</a:t>
             </a:fld>
             <a:endParaRPr lang="en-US"/>
           </a:p>
@@ -2910,7 +2910,7 @@
           <a:p>
             <a:fld id="{64E90CE6-407E-314E-8831-A758B2A8D2EF}" type="datetimeFigureOut">
               <a:rPr lang="en-US" smtClean="0"/>
-              <a:t>1/21/23</a:t>
+              <a:t>1/22/23</a:t>
             </a:fld>
             <a:endParaRPr lang="en-US"/>
           </a:p>
@@ -5610,6 +5610,10 @@
                 <a:t>P1</a:t>
               </a:r>
             </a:p>
+            <a:p>
+              <a:pPr algn="ctr"/>
+              <a:endParaRPr lang="en-US" dirty="0"/>
+            </a:p>
           </p:txBody>
         </p:sp>
         <p:sp>
@@ -5799,6 +5803,10 @@
                 <a:t>P4</a:t>
               </a:r>
             </a:p>
+            <a:p>
+              <a:pPr algn="ctr"/>
+              <a:endParaRPr lang="en-US" dirty="0"/>
+            </a:p>
           </p:txBody>
         </p:sp>
         <p:sp>
@@ -6152,6 +6160,10 @@
                 <a:rPr lang="en-US" dirty="0"/>
                 <a:t>P2</a:t>
               </a:r>
+            </a:p>
+            <a:p>
+              <a:pPr algn="ctr"/>
+              <a:endParaRPr lang="en-US" dirty="0"/>
             </a:p>
           </p:txBody>
         </p:sp>
@@ -6337,6 +6349,10 @@
                 <a:t>P3</a:t>
               </a:r>
             </a:p>
+            <a:p>
+              <a:pPr algn="ctr"/>
+              <a:endParaRPr lang="en-US" dirty="0"/>
+            </a:p>
           </p:txBody>
         </p:sp>
         <p:sp>
@@ -6520,6 +6536,10 @@
                 <a:rPr lang="en-US" dirty="0"/>
                 <a:t>P6</a:t>
               </a:r>
+            </a:p>
+            <a:p>
+              <a:pPr algn="ctr"/>
+              <a:endParaRPr lang="en-US" dirty="0"/>
             </a:p>
           </p:txBody>
         </p:sp>
@@ -6705,6 +6725,10 @@
                 <a:t>P5</a:t>
               </a:r>
             </a:p>
+            <a:p>
+              <a:pPr algn="ctr"/>
+              <a:endParaRPr lang="en-US" dirty="0"/>
+            </a:p>
           </p:txBody>
         </p:sp>
         <p:sp>
@@ -6987,6 +7011,240 @@
           </a:fontRef>
         </p:style>
       </p:cxnSp>
+      <p:sp>
+        <p:nvSpPr>
+          <p:cNvPr id="5" name="TextBox 4">
+            <a:extLst>
+              <a:ext uri="{FF2B5EF4-FFF2-40B4-BE49-F238E27FC236}">
+                <a16:creationId xmlns:a16="http://schemas.microsoft.com/office/drawing/2014/main" id="{E7C9E192-A770-8C23-40F9-C5F4F26196BB}"/>
+              </a:ext>
+            </a:extLst>
+          </p:cNvPr>
+          <p:cNvSpPr txBox="1"/>
+          <p:nvPr/>
+        </p:nvSpPr>
+        <p:spPr>
+          <a:xfrm>
+            <a:off x="3321653" y="4508603"/>
+            <a:ext cx="587020" cy="200055"/>
+          </a:xfrm>
+          <a:prstGeom prst="rect">
+            <a:avLst/>
+          </a:prstGeom>
+          <a:noFill/>
+        </p:spPr>
+        <p:txBody>
+          <a:bodyPr wrap="none" rtlCol="0">
+            <a:spAutoFit/>
+          </a:bodyPr>
+          <a:lstStyle/>
+          <a:p>
+            <a:r>
+              <a:rPr lang="en-US" sz="700" dirty="0">
+                <a:solidFill>
+                  <a:schemeClr val="bg1"/>
+                </a:solidFill>
+              </a:rPr>
+              <a:t>peer2.org1</a:t>
+            </a:r>
+          </a:p>
+        </p:txBody>
+      </p:sp>
+      <p:sp>
+        <p:nvSpPr>
+          <p:cNvPr id="49" name="TextBox 48">
+            <a:extLst>
+              <a:ext uri="{FF2B5EF4-FFF2-40B4-BE49-F238E27FC236}">
+                <a16:creationId xmlns:a16="http://schemas.microsoft.com/office/drawing/2014/main" id="{6C1B0CA0-B90F-5C47-79FB-70BBE564DA54}"/>
+              </a:ext>
+            </a:extLst>
+          </p:cNvPr>
+          <p:cNvSpPr txBox="1"/>
+          <p:nvPr/>
+        </p:nvSpPr>
+        <p:spPr>
+          <a:xfrm>
+            <a:off x="2158945" y="3159006"/>
+            <a:ext cx="587020" cy="200055"/>
+          </a:xfrm>
+          <a:prstGeom prst="rect">
+            <a:avLst/>
+          </a:prstGeom>
+          <a:noFill/>
+        </p:spPr>
+        <p:txBody>
+          <a:bodyPr wrap="none" rtlCol="0">
+            <a:spAutoFit/>
+          </a:bodyPr>
+          <a:lstStyle/>
+          <a:p>
+            <a:r>
+              <a:rPr lang="en-US" sz="700" dirty="0">
+                <a:solidFill>
+                  <a:schemeClr val="bg1"/>
+                </a:solidFill>
+              </a:rPr>
+              <a:t>peer1.org1</a:t>
+            </a:r>
+          </a:p>
+        </p:txBody>
+      </p:sp>
+      <p:sp>
+        <p:nvSpPr>
+          <p:cNvPr id="50" name="TextBox 49">
+            <a:extLst>
+              <a:ext uri="{FF2B5EF4-FFF2-40B4-BE49-F238E27FC236}">
+                <a16:creationId xmlns:a16="http://schemas.microsoft.com/office/drawing/2014/main" id="{85C681F0-0344-E2D7-1EDE-3E1F201E8927}"/>
+              </a:ext>
+            </a:extLst>
+          </p:cNvPr>
+          <p:cNvSpPr txBox="1"/>
+          <p:nvPr/>
+        </p:nvSpPr>
+        <p:spPr>
+          <a:xfrm>
+            <a:off x="3867244" y="2195619"/>
+            <a:ext cx="587020" cy="200055"/>
+          </a:xfrm>
+          <a:prstGeom prst="rect">
+            <a:avLst/>
+          </a:prstGeom>
+          <a:noFill/>
+        </p:spPr>
+        <p:txBody>
+          <a:bodyPr wrap="none" rtlCol="0">
+            <a:spAutoFit/>
+          </a:bodyPr>
+          <a:lstStyle/>
+          <a:p>
+            <a:r>
+              <a:rPr lang="en-US" sz="700" dirty="0">
+                <a:solidFill>
+                  <a:schemeClr val="bg1"/>
+                </a:solidFill>
+              </a:rPr>
+              <a:t>peer0.org1</a:t>
+            </a:r>
+          </a:p>
+        </p:txBody>
+      </p:sp>
+      <p:sp>
+        <p:nvSpPr>
+          <p:cNvPr id="53" name="TextBox 52">
+            <a:extLst>
+              <a:ext uri="{FF2B5EF4-FFF2-40B4-BE49-F238E27FC236}">
+                <a16:creationId xmlns:a16="http://schemas.microsoft.com/office/drawing/2014/main" id="{A074DAED-BA11-9E72-CC59-DD8D82A2E87B}"/>
+              </a:ext>
+            </a:extLst>
+          </p:cNvPr>
+          <p:cNvSpPr txBox="1"/>
+          <p:nvPr/>
+        </p:nvSpPr>
+        <p:spPr>
+          <a:xfrm>
+            <a:off x="7387646" y="2202491"/>
+            <a:ext cx="587020" cy="200055"/>
+          </a:xfrm>
+          <a:prstGeom prst="rect">
+            <a:avLst/>
+          </a:prstGeom>
+          <a:noFill/>
+        </p:spPr>
+        <p:txBody>
+          <a:bodyPr wrap="none" rtlCol="0">
+            <a:spAutoFit/>
+          </a:bodyPr>
+          <a:lstStyle/>
+          <a:p>
+            <a:r>
+              <a:rPr lang="en-US" sz="700" dirty="0">
+                <a:solidFill>
+                  <a:schemeClr val="bg1"/>
+                </a:solidFill>
+              </a:rPr>
+              <a:t>peer0.org2</a:t>
+            </a:r>
+          </a:p>
+        </p:txBody>
+      </p:sp>
+      <p:sp>
+        <p:nvSpPr>
+          <p:cNvPr id="54" name="TextBox 53">
+            <a:extLst>
+              <a:ext uri="{FF2B5EF4-FFF2-40B4-BE49-F238E27FC236}">
+                <a16:creationId xmlns:a16="http://schemas.microsoft.com/office/drawing/2014/main" id="{19F80BF6-064C-E094-BC9F-8D19686C893C}"/>
+              </a:ext>
+            </a:extLst>
+          </p:cNvPr>
+          <p:cNvSpPr txBox="1"/>
+          <p:nvPr/>
+        </p:nvSpPr>
+        <p:spPr>
+          <a:xfrm>
+            <a:off x="9065113" y="3174334"/>
+            <a:ext cx="587020" cy="200055"/>
+          </a:xfrm>
+          <a:prstGeom prst="rect">
+            <a:avLst/>
+          </a:prstGeom>
+          <a:noFill/>
+        </p:spPr>
+        <p:txBody>
+          <a:bodyPr wrap="none" rtlCol="0">
+            <a:spAutoFit/>
+          </a:bodyPr>
+          <a:lstStyle/>
+          <a:p>
+            <a:r>
+              <a:rPr lang="en-US" sz="700" dirty="0">
+                <a:solidFill>
+                  <a:schemeClr val="bg1"/>
+                </a:solidFill>
+              </a:rPr>
+              <a:t>peer1.org2</a:t>
+            </a:r>
+          </a:p>
+        </p:txBody>
+      </p:sp>
+      <p:sp>
+        <p:nvSpPr>
+          <p:cNvPr id="56" name="TextBox 55">
+            <a:extLst>
+              <a:ext uri="{FF2B5EF4-FFF2-40B4-BE49-F238E27FC236}">
+                <a16:creationId xmlns:a16="http://schemas.microsoft.com/office/drawing/2014/main" id="{ADB58E9C-EC0D-145A-04CC-EAD2A6FD0B34}"/>
+              </a:ext>
+            </a:extLst>
+          </p:cNvPr>
+          <p:cNvSpPr txBox="1"/>
+          <p:nvPr/>
+        </p:nvSpPr>
+        <p:spPr>
+          <a:xfrm>
+            <a:off x="7945474" y="4525797"/>
+            <a:ext cx="587020" cy="200055"/>
+          </a:xfrm>
+          <a:prstGeom prst="rect">
+            <a:avLst/>
+          </a:prstGeom>
+          <a:noFill/>
+        </p:spPr>
+        <p:txBody>
+          <a:bodyPr wrap="none" rtlCol="0">
+            <a:spAutoFit/>
+          </a:bodyPr>
+          <a:lstStyle/>
+          <a:p>
+            <a:r>
+              <a:rPr lang="en-US" sz="700" dirty="0">
+                <a:solidFill>
+                  <a:schemeClr val="bg1"/>
+                </a:solidFill>
+              </a:rPr>
+              <a:t>peer2.org2</a:t>
+            </a:r>
+          </a:p>
+        </p:txBody>
+      </p:sp>
     </p:spTree>
     <p:extLst>
       <p:ext uri="{BB962C8B-B14F-4D97-AF65-F5344CB8AC3E}">

</xml_diff>